<commit_message>
Fixed iscoscutellarin fresh data
</commit_message>
<xml_diff>
--- a/figures/manuscript/isoscutellarin/figure_legend.pptx
+++ b/figures/manuscript/isoscutellarin/figure_legend.pptx
@@ -255,7 +255,7 @@
           <a:p>
             <a:fld id="{5F35A656-45FC-4BC5-B599-2BD02740AE99}" type="datetimeFigureOut">
               <a:rPr lang="en-US" smtClean="0"/>
-              <a:t>5/22/2021</a:t>
+              <a:t>5/25/2021</a:t>
             </a:fld>
             <a:endParaRPr lang="en-US"/>
           </a:p>
@@ -425,7 +425,7 @@
           <a:p>
             <a:fld id="{5F35A656-45FC-4BC5-B599-2BD02740AE99}" type="datetimeFigureOut">
               <a:rPr lang="en-US" smtClean="0"/>
-              <a:t>5/22/2021</a:t>
+              <a:t>5/25/2021</a:t>
             </a:fld>
             <a:endParaRPr lang="en-US"/>
           </a:p>
@@ -605,7 +605,7 @@
           <a:p>
             <a:fld id="{5F35A656-45FC-4BC5-B599-2BD02740AE99}" type="datetimeFigureOut">
               <a:rPr lang="en-US" smtClean="0"/>
-              <a:t>5/22/2021</a:t>
+              <a:t>5/25/2021</a:t>
             </a:fld>
             <a:endParaRPr lang="en-US"/>
           </a:p>
@@ -775,7 +775,7 @@
           <a:p>
             <a:fld id="{5F35A656-45FC-4BC5-B599-2BD02740AE99}" type="datetimeFigureOut">
               <a:rPr lang="en-US" smtClean="0"/>
-              <a:t>5/22/2021</a:t>
+              <a:t>5/25/2021</a:t>
             </a:fld>
             <a:endParaRPr lang="en-US"/>
           </a:p>
@@ -1019,7 +1019,7 @@
           <a:p>
             <a:fld id="{5F35A656-45FC-4BC5-B599-2BD02740AE99}" type="datetimeFigureOut">
               <a:rPr lang="en-US" smtClean="0"/>
-              <a:t>5/22/2021</a:t>
+              <a:t>5/25/2021</a:t>
             </a:fld>
             <a:endParaRPr lang="en-US"/>
           </a:p>
@@ -1251,7 +1251,7 @@
           <a:p>
             <a:fld id="{5F35A656-45FC-4BC5-B599-2BD02740AE99}" type="datetimeFigureOut">
               <a:rPr lang="en-US" smtClean="0"/>
-              <a:t>5/22/2021</a:t>
+              <a:t>5/25/2021</a:t>
             </a:fld>
             <a:endParaRPr lang="en-US"/>
           </a:p>
@@ -1618,7 +1618,7 @@
           <a:p>
             <a:fld id="{5F35A656-45FC-4BC5-B599-2BD02740AE99}" type="datetimeFigureOut">
               <a:rPr lang="en-US" smtClean="0"/>
-              <a:t>5/22/2021</a:t>
+              <a:t>5/25/2021</a:t>
             </a:fld>
             <a:endParaRPr lang="en-US"/>
           </a:p>
@@ -1736,7 +1736,7 @@
           <a:p>
             <a:fld id="{5F35A656-45FC-4BC5-B599-2BD02740AE99}" type="datetimeFigureOut">
               <a:rPr lang="en-US" smtClean="0"/>
-              <a:t>5/22/2021</a:t>
+              <a:t>5/25/2021</a:t>
             </a:fld>
             <a:endParaRPr lang="en-US"/>
           </a:p>
@@ -1831,7 +1831,7 @@
           <a:p>
             <a:fld id="{5F35A656-45FC-4BC5-B599-2BD02740AE99}" type="datetimeFigureOut">
               <a:rPr lang="en-US" smtClean="0"/>
-              <a:t>5/22/2021</a:t>
+              <a:t>5/25/2021</a:t>
             </a:fld>
             <a:endParaRPr lang="en-US"/>
           </a:p>
@@ -2108,7 +2108,7 @@
           <a:p>
             <a:fld id="{5F35A656-45FC-4BC5-B599-2BD02740AE99}" type="datetimeFigureOut">
               <a:rPr lang="en-US" smtClean="0"/>
-              <a:t>5/22/2021</a:t>
+              <a:t>5/25/2021</a:t>
             </a:fld>
             <a:endParaRPr lang="en-US"/>
           </a:p>
@@ -2365,7 +2365,7 @@
           <a:p>
             <a:fld id="{5F35A656-45FC-4BC5-B599-2BD02740AE99}" type="datetimeFigureOut">
               <a:rPr lang="en-US" smtClean="0"/>
-              <a:t>5/22/2021</a:t>
+              <a:t>5/25/2021</a:t>
             </a:fld>
             <a:endParaRPr lang="en-US"/>
           </a:p>
@@ -2578,7 +2578,7 @@
           <a:p>
             <a:fld id="{5F35A656-45FC-4BC5-B599-2BD02740AE99}" type="datetimeFigureOut">
               <a:rPr lang="en-US" smtClean="0"/>
-              <a:t>5/22/2021</a:t>
+              <a:t>5/25/2021</a:t>
             </a:fld>
             <a:endParaRPr lang="en-US"/>
           </a:p>
@@ -2997,8 +2997,8 @@
         </p:nvSpPr>
         <p:spPr>
           <a:xfrm>
-            <a:off x="0" y="9658290"/>
-            <a:ext cx="7772400" cy="400110"/>
+            <a:off x="0" y="9350514"/>
+            <a:ext cx="7772400" cy="707886"/>
           </a:xfrm>
           <a:prstGeom prst="rect">
             <a:avLst/>
@@ -3023,7 +3023,21 @@
                 <a:latin typeface="Arial" panose="020B0604020202020204" pitchFamily="34" charset="0"/>
                 <a:cs typeface="Arial" panose="020B0604020202020204" pitchFamily="34" charset="0"/>
               </a:rPr>
-              <a:t>Proposed 4´-hydroxyflavone and 4´-deoxyflavone pathway with aglycones only. Enzyme names in blue are specific isoforms that have been identified in S. baicalensis, and enzyme names in black are general names.</a:t>
+              <a:t>Proposed 4´-hydroxyflavone and 4´-deoxyflavone pathway. Structures of glycosylated metabolites are not shown to save space but are included in Appendix S1. Enzyme names in blue are specific isoforms that have been identified in </a:t>
+            </a:r>
+            <a:r>
+              <a:rPr lang="en-US" sz="1000" i="1" dirty="0">
+                <a:latin typeface="Arial" panose="020B0604020202020204" pitchFamily="34" charset="0"/>
+                <a:cs typeface="Arial" panose="020B0604020202020204" pitchFamily="34" charset="0"/>
+              </a:rPr>
+              <a:t>S. baicalensis</a:t>
+            </a:r>
+            <a:r>
+              <a:rPr lang="en-US" sz="1000" dirty="0">
+                <a:latin typeface="Arial" panose="020B0604020202020204" pitchFamily="34" charset="0"/>
+                <a:cs typeface="Arial" panose="020B0604020202020204" pitchFamily="34" charset="0"/>
+              </a:rPr>
+              <a:t>, and enzyme names in black are general names. Metabolites that were quantified have names in bold and are numbered to match the labeling of Figure 2.</a:t>
             </a:r>
             <a:endParaRPr lang="en-US" sz="1000" b="1" dirty="0">
               <a:latin typeface="Arial" panose="020B0604020202020204" pitchFamily="34" charset="0"/>
@@ -3034,10 +3048,10 @@
       </p:sp>
       <p:pic>
         <p:nvPicPr>
-          <p:cNvPr id="3" name="Picture 2" descr="Diagram&#10;&#10;Description automatically generated">
+          <p:cNvPr id="7" name="Picture 6" descr="A picture containing schematic&#10;&#10;Description automatically generated">
             <a:extLst>
               <a:ext uri="{FF2B5EF4-FFF2-40B4-BE49-F238E27FC236}">
-                <a16:creationId xmlns:a16="http://schemas.microsoft.com/office/drawing/2014/main" id="{71BDCE88-3E04-42C5-8409-927360FE89AE}"/>
+                <a16:creationId xmlns:a16="http://schemas.microsoft.com/office/drawing/2014/main" id="{95E4CEED-5F86-4F39-8A5F-BE3E24CD3F7F}"/>
               </a:ext>
             </a:extLst>
           </p:cNvPr>
@@ -3060,8 +3074,8 @@
         </p:blipFill>
         <p:spPr>
           <a:xfrm>
-            <a:off x="1665804" y="438912"/>
-            <a:ext cx="4440791" cy="8631936"/>
+            <a:off x="212680" y="1093118"/>
+            <a:ext cx="7347040" cy="7371261"/>
           </a:xfrm>
           <a:prstGeom prst="rect">
             <a:avLst/>

</xml_diff>

<commit_message>
Created stacked bars without KR data
</commit_message>
<xml_diff>
--- a/figures/manuscript/isoscutellarin/figure_legend.pptx
+++ b/figures/manuscript/isoscutellarin/figure_legend.pptx
@@ -255,7 +255,7 @@
           <a:p>
             <a:fld id="{5F35A656-45FC-4BC5-B599-2BD02740AE99}" type="datetimeFigureOut">
               <a:rPr lang="en-US" smtClean="0"/>
-              <a:t>5/25/2021</a:t>
+              <a:t>5/26/2021</a:t>
             </a:fld>
             <a:endParaRPr lang="en-US"/>
           </a:p>
@@ -425,7 +425,7 @@
           <a:p>
             <a:fld id="{5F35A656-45FC-4BC5-B599-2BD02740AE99}" type="datetimeFigureOut">
               <a:rPr lang="en-US" smtClean="0"/>
-              <a:t>5/25/2021</a:t>
+              <a:t>5/26/2021</a:t>
             </a:fld>
             <a:endParaRPr lang="en-US"/>
           </a:p>
@@ -605,7 +605,7 @@
           <a:p>
             <a:fld id="{5F35A656-45FC-4BC5-B599-2BD02740AE99}" type="datetimeFigureOut">
               <a:rPr lang="en-US" smtClean="0"/>
-              <a:t>5/25/2021</a:t>
+              <a:t>5/26/2021</a:t>
             </a:fld>
             <a:endParaRPr lang="en-US"/>
           </a:p>
@@ -775,7 +775,7 @@
           <a:p>
             <a:fld id="{5F35A656-45FC-4BC5-B599-2BD02740AE99}" type="datetimeFigureOut">
               <a:rPr lang="en-US" smtClean="0"/>
-              <a:t>5/25/2021</a:t>
+              <a:t>5/26/2021</a:t>
             </a:fld>
             <a:endParaRPr lang="en-US"/>
           </a:p>
@@ -1019,7 +1019,7 @@
           <a:p>
             <a:fld id="{5F35A656-45FC-4BC5-B599-2BD02740AE99}" type="datetimeFigureOut">
               <a:rPr lang="en-US" smtClean="0"/>
-              <a:t>5/25/2021</a:t>
+              <a:t>5/26/2021</a:t>
             </a:fld>
             <a:endParaRPr lang="en-US"/>
           </a:p>
@@ -1251,7 +1251,7 @@
           <a:p>
             <a:fld id="{5F35A656-45FC-4BC5-B599-2BD02740AE99}" type="datetimeFigureOut">
               <a:rPr lang="en-US" smtClean="0"/>
-              <a:t>5/25/2021</a:t>
+              <a:t>5/26/2021</a:t>
             </a:fld>
             <a:endParaRPr lang="en-US"/>
           </a:p>
@@ -1618,7 +1618,7 @@
           <a:p>
             <a:fld id="{5F35A656-45FC-4BC5-B599-2BD02740AE99}" type="datetimeFigureOut">
               <a:rPr lang="en-US" smtClean="0"/>
-              <a:t>5/25/2021</a:t>
+              <a:t>5/26/2021</a:t>
             </a:fld>
             <a:endParaRPr lang="en-US"/>
           </a:p>
@@ -1736,7 +1736,7 @@
           <a:p>
             <a:fld id="{5F35A656-45FC-4BC5-B599-2BD02740AE99}" type="datetimeFigureOut">
               <a:rPr lang="en-US" smtClean="0"/>
-              <a:t>5/25/2021</a:t>
+              <a:t>5/26/2021</a:t>
             </a:fld>
             <a:endParaRPr lang="en-US"/>
           </a:p>
@@ -1831,7 +1831,7 @@
           <a:p>
             <a:fld id="{5F35A656-45FC-4BC5-B599-2BD02740AE99}" type="datetimeFigureOut">
               <a:rPr lang="en-US" smtClean="0"/>
-              <a:t>5/25/2021</a:t>
+              <a:t>5/26/2021</a:t>
             </a:fld>
             <a:endParaRPr lang="en-US"/>
           </a:p>
@@ -2108,7 +2108,7 @@
           <a:p>
             <a:fld id="{5F35A656-45FC-4BC5-B599-2BD02740AE99}" type="datetimeFigureOut">
               <a:rPr lang="en-US" smtClean="0"/>
-              <a:t>5/25/2021</a:t>
+              <a:t>5/26/2021</a:t>
             </a:fld>
             <a:endParaRPr lang="en-US"/>
           </a:p>
@@ -2365,7 +2365,7 @@
           <a:p>
             <a:fld id="{5F35A656-45FC-4BC5-B599-2BD02740AE99}" type="datetimeFigureOut">
               <a:rPr lang="en-US" smtClean="0"/>
-              <a:t>5/25/2021</a:t>
+              <a:t>5/26/2021</a:t>
             </a:fld>
             <a:endParaRPr lang="en-US"/>
           </a:p>
@@ -2578,7 +2578,7 @@
           <a:p>
             <a:fld id="{5F35A656-45FC-4BC5-B599-2BD02740AE99}" type="datetimeFigureOut">
               <a:rPr lang="en-US" smtClean="0"/>
-              <a:t>5/25/2021</a:t>
+              <a:t>5/26/2021</a:t>
             </a:fld>
             <a:endParaRPr lang="en-US"/>
           </a:p>
@@ -3112,6 +3112,42 @@
           <a:chExt cx="0" cy="0"/>
         </a:xfrm>
       </p:grpSpPr>
+      <p:pic>
+        <p:nvPicPr>
+          <p:cNvPr id="3" name="Picture 2" descr="Chart&#10;&#10;Description automatically generated">
+            <a:extLst>
+              <a:ext uri="{FF2B5EF4-FFF2-40B4-BE49-F238E27FC236}">
+                <a16:creationId xmlns:a16="http://schemas.microsoft.com/office/drawing/2014/main" id="{CB7E79BB-9E27-43F5-8EC5-662B77F51D47}"/>
+              </a:ext>
+            </a:extLst>
+          </p:cNvPr>
+          <p:cNvPicPr>
+            <a:picLocks noChangeAspect="1"/>
+          </p:cNvPicPr>
+          <p:nvPr/>
+        </p:nvPicPr>
+        <p:blipFill>
+          <a:blip r:embed="rId2">
+            <a:extLst>
+              <a:ext uri="{28A0092B-C50C-407E-A947-70E740481C1C}">
+                <a14:useLocalDpi xmlns:a14="http://schemas.microsoft.com/office/drawing/2010/main" val="0"/>
+              </a:ext>
+            </a:extLst>
+          </a:blip>
+          <a:stretch>
+            <a:fillRect/>
+          </a:stretch>
+        </p:blipFill>
+        <p:spPr>
+          <a:xfrm>
+            <a:off x="270958" y="532772"/>
+            <a:ext cx="7230484" cy="8992855"/>
+          </a:xfrm>
+          <a:prstGeom prst="rect">
+            <a:avLst/>
+          </a:prstGeom>
+        </p:spPr>
+      </p:pic>
     </p:spTree>
     <p:extLst>
       <p:ext uri="{BB962C8B-B14F-4D97-AF65-F5344CB8AC3E}">

</xml_diff>

<commit_message>
Reduced spacing in noKR plot
</commit_message>
<xml_diff>
--- a/figures/manuscript/isoscutellarin/figure_legend.pptx
+++ b/figures/manuscript/isoscutellarin/figure_legend.pptx
@@ -7,6 +7,8 @@
   <p:sldIdLst>
     <p:sldId id="256" r:id="rId2"/>
     <p:sldId id="257" r:id="rId3"/>
+    <p:sldId id="258" r:id="rId4"/>
+    <p:sldId id="259" r:id="rId5"/>
   </p:sldIdLst>
   <p:sldSz cx="7772400" cy="10058400"/>
   <p:notesSz cx="6858000" cy="9144000"/>
@@ -255,7 +257,7 @@
           <a:p>
             <a:fld id="{5F35A656-45FC-4BC5-B599-2BD02740AE99}" type="datetimeFigureOut">
               <a:rPr lang="en-US" smtClean="0"/>
-              <a:t>5/26/2021</a:t>
+              <a:t>6/1/2021</a:t>
             </a:fld>
             <a:endParaRPr lang="en-US"/>
           </a:p>
@@ -425,7 +427,7 @@
           <a:p>
             <a:fld id="{5F35A656-45FC-4BC5-B599-2BD02740AE99}" type="datetimeFigureOut">
               <a:rPr lang="en-US" smtClean="0"/>
-              <a:t>5/26/2021</a:t>
+              <a:t>6/1/2021</a:t>
             </a:fld>
             <a:endParaRPr lang="en-US"/>
           </a:p>
@@ -605,7 +607,7 @@
           <a:p>
             <a:fld id="{5F35A656-45FC-4BC5-B599-2BD02740AE99}" type="datetimeFigureOut">
               <a:rPr lang="en-US" smtClean="0"/>
-              <a:t>5/26/2021</a:t>
+              <a:t>6/1/2021</a:t>
             </a:fld>
             <a:endParaRPr lang="en-US"/>
           </a:p>
@@ -775,7 +777,7 @@
           <a:p>
             <a:fld id="{5F35A656-45FC-4BC5-B599-2BD02740AE99}" type="datetimeFigureOut">
               <a:rPr lang="en-US" smtClean="0"/>
-              <a:t>5/26/2021</a:t>
+              <a:t>6/1/2021</a:t>
             </a:fld>
             <a:endParaRPr lang="en-US"/>
           </a:p>
@@ -1019,7 +1021,7 @@
           <a:p>
             <a:fld id="{5F35A656-45FC-4BC5-B599-2BD02740AE99}" type="datetimeFigureOut">
               <a:rPr lang="en-US" smtClean="0"/>
-              <a:t>5/26/2021</a:t>
+              <a:t>6/1/2021</a:t>
             </a:fld>
             <a:endParaRPr lang="en-US"/>
           </a:p>
@@ -1251,7 +1253,7 @@
           <a:p>
             <a:fld id="{5F35A656-45FC-4BC5-B599-2BD02740AE99}" type="datetimeFigureOut">
               <a:rPr lang="en-US" smtClean="0"/>
-              <a:t>5/26/2021</a:t>
+              <a:t>6/1/2021</a:t>
             </a:fld>
             <a:endParaRPr lang="en-US"/>
           </a:p>
@@ -1618,7 +1620,7 @@
           <a:p>
             <a:fld id="{5F35A656-45FC-4BC5-B599-2BD02740AE99}" type="datetimeFigureOut">
               <a:rPr lang="en-US" smtClean="0"/>
-              <a:t>5/26/2021</a:t>
+              <a:t>6/1/2021</a:t>
             </a:fld>
             <a:endParaRPr lang="en-US"/>
           </a:p>
@@ -1736,7 +1738,7 @@
           <a:p>
             <a:fld id="{5F35A656-45FC-4BC5-B599-2BD02740AE99}" type="datetimeFigureOut">
               <a:rPr lang="en-US" smtClean="0"/>
-              <a:t>5/26/2021</a:t>
+              <a:t>6/1/2021</a:t>
             </a:fld>
             <a:endParaRPr lang="en-US"/>
           </a:p>
@@ -1831,7 +1833,7 @@
           <a:p>
             <a:fld id="{5F35A656-45FC-4BC5-B599-2BD02740AE99}" type="datetimeFigureOut">
               <a:rPr lang="en-US" smtClean="0"/>
-              <a:t>5/26/2021</a:t>
+              <a:t>6/1/2021</a:t>
             </a:fld>
             <a:endParaRPr lang="en-US"/>
           </a:p>
@@ -2108,7 +2110,7 @@
           <a:p>
             <a:fld id="{5F35A656-45FC-4BC5-B599-2BD02740AE99}" type="datetimeFigureOut">
               <a:rPr lang="en-US" smtClean="0"/>
-              <a:t>5/26/2021</a:t>
+              <a:t>6/1/2021</a:t>
             </a:fld>
             <a:endParaRPr lang="en-US"/>
           </a:p>
@@ -2365,7 +2367,7 @@
           <a:p>
             <a:fld id="{5F35A656-45FC-4BC5-B599-2BD02740AE99}" type="datetimeFigureOut">
               <a:rPr lang="en-US" smtClean="0"/>
-              <a:t>5/26/2021</a:t>
+              <a:t>6/1/2021</a:t>
             </a:fld>
             <a:endParaRPr lang="en-US"/>
           </a:p>
@@ -2578,7 +2580,7 @@
           <a:p>
             <a:fld id="{5F35A656-45FC-4BC5-B599-2BD02740AE99}" type="datetimeFigureOut">
               <a:rPr lang="en-US" smtClean="0"/>
-              <a:t>5/26/2021</a:t>
+              <a:t>6/1/2021</a:t>
             </a:fld>
             <a:endParaRPr lang="en-US"/>
           </a:p>
@@ -3114,10 +3116,10 @@
       </p:grpSpPr>
       <p:pic>
         <p:nvPicPr>
-          <p:cNvPr id="3" name="Picture 2" descr="Chart&#10;&#10;Description automatically generated">
+          <p:cNvPr id="4" name="Picture 3" descr="Chart&#10;&#10;Description automatically generated">
             <a:extLst>
               <a:ext uri="{FF2B5EF4-FFF2-40B4-BE49-F238E27FC236}">
-                <a16:creationId xmlns:a16="http://schemas.microsoft.com/office/drawing/2014/main" id="{CB7E79BB-9E27-43F5-8EC5-662B77F51D47}"/>
+                <a16:creationId xmlns:a16="http://schemas.microsoft.com/office/drawing/2014/main" id="{C069843F-F3EC-4D9E-B62C-8919B8BB7A07}"/>
               </a:ext>
             </a:extLst>
           </p:cNvPr>
@@ -3140,8 +3142,8 @@
         </p:blipFill>
         <p:spPr>
           <a:xfrm>
-            <a:off x="270958" y="532772"/>
-            <a:ext cx="7230484" cy="8992855"/>
+            <a:off x="0" y="204951"/>
+            <a:ext cx="7772400" cy="9648497"/>
           </a:xfrm>
           <a:prstGeom prst="rect">
             <a:avLst/>
@@ -3152,6 +3154,102 @@
     <p:extLst>
       <p:ext uri="{BB962C8B-B14F-4D97-AF65-F5344CB8AC3E}">
         <p14:creationId xmlns:p14="http://schemas.microsoft.com/office/powerpoint/2010/main" val="1443929572"/>
+      </p:ext>
+    </p:extLst>
+  </p:cSld>
+  <p:clrMapOvr>
+    <a:masterClrMapping/>
+  </p:clrMapOvr>
+</p:sld>
+</file>
+
+<file path=ppt/slides/slide3.xml><?xml version="1.0" encoding="utf-8"?>
+<p:sld xmlns:a="http://schemas.openxmlformats.org/drawingml/2006/main" xmlns:r="http://schemas.openxmlformats.org/officeDocument/2006/relationships" xmlns:p="http://schemas.openxmlformats.org/presentationml/2006/main">
+  <p:cSld>
+    <p:spTree>
+      <p:nvGrpSpPr>
+        <p:cNvPr id="1" name=""/>
+        <p:cNvGrpSpPr/>
+        <p:nvPr/>
+      </p:nvGrpSpPr>
+      <p:grpSpPr>
+        <a:xfrm>
+          <a:off x="0" y="0"/>
+          <a:ext cx="0" cy="0"/>
+          <a:chOff x="0" y="0"/>
+          <a:chExt cx="0" cy="0"/>
+        </a:xfrm>
+      </p:grpSpPr>
+      <p:pic>
+        <p:nvPicPr>
+          <p:cNvPr id="3" name="Picture 2" descr="Chart&#10;&#10;Description automatically generated">
+            <a:extLst>
+              <a:ext uri="{FF2B5EF4-FFF2-40B4-BE49-F238E27FC236}">
+                <a16:creationId xmlns:a16="http://schemas.microsoft.com/office/drawing/2014/main" id="{3D84C22D-8EFC-4949-A12B-30964E6AA008}"/>
+              </a:ext>
+            </a:extLst>
+          </p:cNvPr>
+          <p:cNvPicPr>
+            <a:picLocks noChangeAspect="1"/>
+          </p:cNvPicPr>
+          <p:nvPr/>
+        </p:nvPicPr>
+        <p:blipFill>
+          <a:blip r:embed="rId2">
+            <a:extLst>
+              <a:ext uri="{28A0092B-C50C-407E-A947-70E740481C1C}">
+                <a14:useLocalDpi xmlns:a14="http://schemas.microsoft.com/office/drawing/2010/main" val="0"/>
+              </a:ext>
+            </a:extLst>
+          </a:blip>
+          <a:stretch>
+            <a:fillRect/>
+          </a:stretch>
+        </p:blipFill>
+        <p:spPr>
+          <a:xfrm>
+            <a:off x="1259978" y="1886742"/>
+            <a:ext cx="5252443" cy="6284915"/>
+          </a:xfrm>
+          <a:prstGeom prst="rect">
+            <a:avLst/>
+          </a:prstGeom>
+        </p:spPr>
+      </p:pic>
+    </p:spTree>
+    <p:extLst>
+      <p:ext uri="{BB962C8B-B14F-4D97-AF65-F5344CB8AC3E}">
+        <p14:creationId xmlns:p14="http://schemas.microsoft.com/office/powerpoint/2010/main" val="3800786646"/>
+      </p:ext>
+    </p:extLst>
+  </p:cSld>
+  <p:clrMapOvr>
+    <a:masterClrMapping/>
+  </p:clrMapOvr>
+</p:sld>
+</file>
+
+<file path=ppt/slides/slide4.xml><?xml version="1.0" encoding="utf-8"?>
+<p:sld xmlns:a="http://schemas.openxmlformats.org/drawingml/2006/main" xmlns:r="http://schemas.openxmlformats.org/officeDocument/2006/relationships" xmlns:p="http://schemas.openxmlformats.org/presentationml/2006/main">
+  <p:cSld>
+    <p:spTree>
+      <p:nvGrpSpPr>
+        <p:cNvPr id="1" name=""/>
+        <p:cNvGrpSpPr/>
+        <p:nvPr/>
+      </p:nvGrpSpPr>
+      <p:grpSpPr>
+        <a:xfrm>
+          <a:off x="0" y="0"/>
+          <a:ext cx="0" cy="0"/>
+          <a:chOff x="0" y="0"/>
+          <a:chExt cx="0" cy="0"/>
+        </a:xfrm>
+      </p:grpSpPr>
+    </p:spTree>
+    <p:extLst>
+      <p:ext uri="{BB962C8B-B14F-4D97-AF65-F5344CB8AC3E}">
+        <p14:creationId xmlns:p14="http://schemas.microsoft.com/office/powerpoint/2010/main" val="2182655540"/>
       </p:ext>
     </p:extLst>
   </p:cSld>

</xml_diff>

<commit_message>
Modified lab meeting presentation
</commit_message>
<xml_diff>
--- a/figures/manuscript/isoscutellarin/figure_legend.pptx
+++ b/figures/manuscript/isoscutellarin/figure_legend.pptx
@@ -11048,7 +11048,7 @@
         </p:nvSpPr>
         <p:spPr>
           <a:xfrm>
-            <a:off x="1489005" y="8616185"/>
+            <a:off x="1557294" y="7205568"/>
             <a:ext cx="5051832" cy="369332"/>
           </a:xfrm>
           <a:prstGeom prst="rect">
@@ -11153,7 +11153,7 @@
         </p:blipFill>
         <p:spPr bwMode="auto">
           <a:xfrm rot="10800000">
-            <a:off x="2504791" y="3996179"/>
+            <a:off x="2457450" y="3838248"/>
             <a:ext cx="2857500" cy="2857500"/>
           </a:xfrm>
           <a:prstGeom prst="rect">
@@ -11185,7 +11185,7 @@
         </p:nvSpPr>
         <p:spPr>
           <a:xfrm>
-            <a:off x="1890012" y="6914639"/>
+            <a:off x="534353" y="3310366"/>
             <a:ext cx="3992375" cy="369332"/>
           </a:xfrm>
           <a:prstGeom prst="rect">
@@ -11208,6 +11208,85 @@
               <a:t>Isoscutellarein</a:t>
             </a:r>
             <a:endParaRPr lang="en-US" dirty="0"/>
+          </a:p>
+        </p:txBody>
+      </p:sp>
+      <p:sp>
+        <p:nvSpPr>
+          <p:cNvPr id="8" name="TextBox 7">
+            <a:extLst>
+              <a:ext uri="{FF2B5EF4-FFF2-40B4-BE49-F238E27FC236}">
+                <a16:creationId xmlns:a16="http://schemas.microsoft.com/office/drawing/2014/main" id="{422C3E49-94EC-4B7B-8584-34DB76E1E0E5}"/>
+              </a:ext>
+            </a:extLst>
+          </p:cNvPr>
+          <p:cNvSpPr txBox="1"/>
+          <p:nvPr/>
+        </p:nvSpPr>
+        <p:spPr>
+          <a:xfrm>
+            <a:off x="534353" y="8054721"/>
+            <a:ext cx="6236323" cy="1477328"/>
+          </a:xfrm>
+          <a:prstGeom prst="rect">
+            <a:avLst/>
+          </a:prstGeom>
+          <a:noFill/>
+        </p:spPr>
+        <p:txBody>
+          <a:bodyPr wrap="none" rtlCol="0">
+            <a:spAutoFit/>
+          </a:bodyPr>
+          <a:lstStyle/>
+          <a:p>
+            <a:r>
+              <a:rPr lang="en-US" b="1" dirty="0"/>
+              <a:t>TODO:</a:t>
+            </a:r>
+          </a:p>
+          <a:p>
+            <a:r>
+              <a:rPr lang="en-US" dirty="0"/>
+              <a:t>Quantify </a:t>
+            </a:r>
+            <a:r>
+              <a:rPr lang="en-US" dirty="0" err="1"/>
+              <a:t>isoscutellarein</a:t>
+            </a:r>
+            <a:r>
+              <a:rPr lang="en-US" dirty="0"/>
+              <a:t> 8-glucuronide in all extractions</a:t>
+            </a:r>
+          </a:p>
+          <a:p>
+            <a:r>
+              <a:rPr lang="en-US" dirty="0"/>
+              <a:t>Apigenin feeding </a:t>
+            </a:r>
+          </a:p>
+          <a:p>
+            <a:r>
+              <a:rPr lang="en-US" dirty="0"/>
+              <a:t>Yeast activity test with </a:t>
+            </a:r>
+            <a:r>
+              <a:rPr lang="en-US" dirty="0" err="1"/>
+              <a:t>Rieske</a:t>
+            </a:r>
+            <a:r>
+              <a:rPr lang="en-US" dirty="0"/>
+              <a:t>-type oxygenase from </a:t>
+            </a:r>
+            <a:r>
+              <a:rPr lang="en-US" i="1" dirty="0"/>
+              <a:t>S. baicalensis</a:t>
+            </a:r>
+          </a:p>
+          <a:p>
+            <a:r>
+              <a:rPr lang="en-US" dirty="0"/>
+              <a:t>Tobacco infiltration with RTO</a:t>
+            </a:r>
           </a:p>
         </p:txBody>
       </p:sp>
@@ -11320,6 +11399,41 @@
                 </a:solidFill>
               </a:rPr>
               <a:t>-type oxygenase?</a:t>
+            </a:r>
+          </a:p>
+        </p:txBody>
+      </p:sp>
+      <p:sp>
+        <p:nvSpPr>
+          <p:cNvPr id="4" name="TextBox 3">
+            <a:extLst>
+              <a:ext uri="{FF2B5EF4-FFF2-40B4-BE49-F238E27FC236}">
+                <a16:creationId xmlns:a16="http://schemas.microsoft.com/office/drawing/2014/main" id="{05F27E70-FA70-4A6C-A023-DAE359BA08DC}"/>
+              </a:ext>
+            </a:extLst>
+          </p:cNvPr>
+          <p:cNvSpPr txBox="1"/>
+          <p:nvPr/>
+        </p:nvSpPr>
+        <p:spPr>
+          <a:xfrm>
+            <a:off x="352167" y="3279483"/>
+            <a:ext cx="1988173" cy="369332"/>
+          </a:xfrm>
+          <a:prstGeom prst="rect">
+            <a:avLst/>
+          </a:prstGeom>
+          <a:noFill/>
+        </p:spPr>
+        <p:txBody>
+          <a:bodyPr wrap="none" rtlCol="0">
+            <a:spAutoFit/>
+          </a:bodyPr>
+          <a:lstStyle/>
+          <a:p>
+            <a:r>
+              <a:rPr lang="en-US" dirty="0"/>
+              <a:t>Proposed pathway:</a:t>
             </a:r>
           </a:p>
         </p:txBody>
@@ -11624,7 +11738,7 @@
         <p:spPr>
           <a:xfrm>
             <a:off x="963168" y="5364480"/>
-            <a:ext cx="4756430" cy="2308324"/>
+            <a:ext cx="6068777" cy="2308324"/>
           </a:xfrm>
           <a:prstGeom prst="rect">
             <a:avLst/>
@@ -11682,7 +11796,7 @@
                   <a:srgbClr val="FF0000"/>
                 </a:solidFill>
               </a:rPr>
-              <a:t>Only SbCYP82D1.1 produces baicalein</a:t>
+              <a:t>Only yeast transformed with SbCYP82D1.1 produces baicalein</a:t>
             </a:r>
           </a:p>
         </p:txBody>
@@ -11717,56 +11831,6 @@
           <a:chExt cx="0" cy="0"/>
         </a:xfrm>
       </p:grpSpPr>
-      <p:sp>
-        <p:nvSpPr>
-          <p:cNvPr id="2" name="Title 1">
-            <a:extLst>
-              <a:ext uri="{FF2B5EF4-FFF2-40B4-BE49-F238E27FC236}">
-                <a16:creationId xmlns:a16="http://schemas.microsoft.com/office/drawing/2014/main" id="{2000A0CE-442E-4201-B29E-FED47FA7F0E4}"/>
-              </a:ext>
-            </a:extLst>
-          </p:cNvPr>
-          <p:cNvSpPr>
-            <a:spLocks noGrp="1"/>
-          </p:cNvSpPr>
-          <p:nvPr>
-            <p:ph type="title"/>
-          </p:nvPr>
-        </p:nvSpPr>
-        <p:spPr/>
-        <p:txBody>
-          <a:bodyPr/>
-          <a:lstStyle/>
-          <a:p>
-            <a:endParaRPr lang="en-US"/>
-          </a:p>
-        </p:txBody>
-      </p:sp>
-      <p:sp>
-        <p:nvSpPr>
-          <p:cNvPr id="3" name="Content Placeholder 2">
-            <a:extLst>
-              <a:ext uri="{FF2B5EF4-FFF2-40B4-BE49-F238E27FC236}">
-                <a16:creationId xmlns:a16="http://schemas.microsoft.com/office/drawing/2014/main" id="{66F1FB1F-0FEC-4750-8013-81C729162321}"/>
-              </a:ext>
-            </a:extLst>
-          </p:cNvPr>
-          <p:cNvSpPr>
-            <a:spLocks noGrp="1"/>
-          </p:cNvSpPr>
-          <p:nvPr>
-            <p:ph idx="1"/>
-          </p:nvPr>
-        </p:nvSpPr>
-        <p:spPr/>
-        <p:txBody>
-          <a:bodyPr/>
-          <a:lstStyle/>
-          <a:p>
-            <a:endParaRPr lang="en-US"/>
-          </a:p>
-        </p:txBody>
-      </p:sp>
       <p:pic>
         <p:nvPicPr>
           <p:cNvPr id="4" name="Picture 3" descr="Chart&#10;&#10;Description automatically generated">

</xml_diff>

<commit_message>
Regenerated isoscutellarin plots to show peak area
</commit_message>
<xml_diff>
--- a/figures/manuscript/isoscutellarin/figure_legend.pptx
+++ b/figures/manuscript/isoscutellarin/figure_legend.pptx
@@ -2946,7 +2946,7 @@
           <a:p>
             <a:fld id="{5F35A656-45FC-4BC5-B599-2BD02740AE99}" type="datetimeFigureOut">
               <a:rPr lang="en-US" smtClean="0"/>
-              <a:t>6/9/2021</a:t>
+              <a:t>7/18/2021</a:t>
             </a:fld>
             <a:endParaRPr lang="en-US"/>
           </a:p>
@@ -3116,7 +3116,7 @@
           <a:p>
             <a:fld id="{5F35A656-45FC-4BC5-B599-2BD02740AE99}" type="datetimeFigureOut">
               <a:rPr lang="en-US" smtClean="0"/>
-              <a:t>6/9/2021</a:t>
+              <a:t>7/18/2021</a:t>
             </a:fld>
             <a:endParaRPr lang="en-US"/>
           </a:p>
@@ -3296,7 +3296,7 @@
           <a:p>
             <a:fld id="{5F35A656-45FC-4BC5-B599-2BD02740AE99}" type="datetimeFigureOut">
               <a:rPr lang="en-US" smtClean="0"/>
-              <a:t>6/9/2021</a:t>
+              <a:t>7/18/2021</a:t>
             </a:fld>
             <a:endParaRPr lang="en-US"/>
           </a:p>
@@ -3466,7 +3466,7 @@
           <a:p>
             <a:fld id="{5F35A656-45FC-4BC5-B599-2BD02740AE99}" type="datetimeFigureOut">
               <a:rPr lang="en-US" smtClean="0"/>
-              <a:t>6/9/2021</a:t>
+              <a:t>7/18/2021</a:t>
             </a:fld>
             <a:endParaRPr lang="en-US"/>
           </a:p>
@@ -3710,7 +3710,7 @@
           <a:p>
             <a:fld id="{5F35A656-45FC-4BC5-B599-2BD02740AE99}" type="datetimeFigureOut">
               <a:rPr lang="en-US" smtClean="0"/>
-              <a:t>6/9/2021</a:t>
+              <a:t>7/18/2021</a:t>
             </a:fld>
             <a:endParaRPr lang="en-US"/>
           </a:p>
@@ -3942,7 +3942,7 @@
           <a:p>
             <a:fld id="{5F35A656-45FC-4BC5-B599-2BD02740AE99}" type="datetimeFigureOut">
               <a:rPr lang="en-US" smtClean="0"/>
-              <a:t>6/9/2021</a:t>
+              <a:t>7/18/2021</a:t>
             </a:fld>
             <a:endParaRPr lang="en-US"/>
           </a:p>
@@ -4309,7 +4309,7 @@
           <a:p>
             <a:fld id="{5F35A656-45FC-4BC5-B599-2BD02740AE99}" type="datetimeFigureOut">
               <a:rPr lang="en-US" smtClean="0"/>
-              <a:t>6/9/2021</a:t>
+              <a:t>7/18/2021</a:t>
             </a:fld>
             <a:endParaRPr lang="en-US"/>
           </a:p>
@@ -4427,7 +4427,7 @@
           <a:p>
             <a:fld id="{5F35A656-45FC-4BC5-B599-2BD02740AE99}" type="datetimeFigureOut">
               <a:rPr lang="en-US" smtClean="0"/>
-              <a:t>6/9/2021</a:t>
+              <a:t>7/18/2021</a:t>
             </a:fld>
             <a:endParaRPr lang="en-US"/>
           </a:p>
@@ -4522,7 +4522,7 @@
           <a:p>
             <a:fld id="{5F35A656-45FC-4BC5-B599-2BD02740AE99}" type="datetimeFigureOut">
               <a:rPr lang="en-US" smtClean="0"/>
-              <a:t>6/9/2021</a:t>
+              <a:t>7/18/2021</a:t>
             </a:fld>
             <a:endParaRPr lang="en-US"/>
           </a:p>
@@ -4799,7 +4799,7 @@
           <a:p>
             <a:fld id="{5F35A656-45FC-4BC5-B599-2BD02740AE99}" type="datetimeFigureOut">
               <a:rPr lang="en-US" smtClean="0"/>
-              <a:t>6/9/2021</a:t>
+              <a:t>7/18/2021</a:t>
             </a:fld>
             <a:endParaRPr lang="en-US"/>
           </a:p>
@@ -5056,7 +5056,7 @@
           <a:p>
             <a:fld id="{5F35A656-45FC-4BC5-B599-2BD02740AE99}" type="datetimeFigureOut">
               <a:rPr lang="en-US" smtClean="0"/>
-              <a:t>6/9/2021</a:t>
+              <a:t>7/18/2021</a:t>
             </a:fld>
             <a:endParaRPr lang="en-US"/>
           </a:p>
@@ -5269,7 +5269,7 @@
           <a:p>
             <a:fld id="{5F35A656-45FC-4BC5-B599-2BD02740AE99}" type="datetimeFigureOut">
               <a:rPr lang="en-US" smtClean="0"/>
-              <a:t>6/9/2021</a:t>
+              <a:t>7/18/2021</a:t>
             </a:fld>
             <a:endParaRPr lang="en-US"/>
           </a:p>
@@ -6068,7 +6068,7 @@
                 <a:latin typeface="Arial" panose="020B0604020202020204" pitchFamily="34" charset="0"/>
                 <a:cs typeface="Arial" panose="020B0604020202020204" pitchFamily="34" charset="0"/>
               </a:rPr>
-              <a:t>Organ-specific metabolite data collected from 9 </a:t>
+              <a:t>Organ-specific metabolite data collected from 7 </a:t>
             </a:r>
             <a:r>
               <a:rPr lang="en-US" sz="1000" i="1" dirty="0">
@@ -6093,10 +6093,10 @@
       </p:sp>
       <p:pic>
         <p:nvPicPr>
-          <p:cNvPr id="5" name="Picture 4" descr="Chart, bar chart&#10;&#10;Description automatically generated">
+          <p:cNvPr id="4" name="Picture 3" descr="Chart&#10;&#10;Description automatically generated">
             <a:extLst>
               <a:ext uri="{FF2B5EF4-FFF2-40B4-BE49-F238E27FC236}">
-                <a16:creationId xmlns:a16="http://schemas.microsoft.com/office/drawing/2014/main" id="{C8FE7F2A-3585-405E-9341-F5E51BCAAF2A}"/>
+                <a16:creationId xmlns:a16="http://schemas.microsoft.com/office/drawing/2014/main" id="{6615D0B4-D0A8-4F5A-8067-54901F48BE93}"/>
               </a:ext>
             </a:extLst>
           </p:cNvPr>
@@ -6119,8 +6119,8 @@
         </p:blipFill>
         <p:spPr>
           <a:xfrm>
-            <a:off x="243348" y="308189"/>
-            <a:ext cx="7285703" cy="9044321"/>
+            <a:off x="1149178" y="213154"/>
+            <a:ext cx="6126892" cy="9190338"/>
           </a:xfrm>
           <a:prstGeom prst="rect">
             <a:avLst/>
@@ -6222,10 +6222,10 @@
       </p:sp>
       <p:pic>
         <p:nvPicPr>
-          <p:cNvPr id="7" name="Picture 6" descr="Chart&#10;&#10;Description automatically generated">
+          <p:cNvPr id="3" name="Picture 2" descr="Chart&#10;&#10;Description automatically generated">
             <a:extLst>
               <a:ext uri="{FF2B5EF4-FFF2-40B4-BE49-F238E27FC236}">
-                <a16:creationId xmlns:a16="http://schemas.microsoft.com/office/drawing/2014/main" id="{77665B38-3E73-4574-A562-BCD90024F6F3}"/>
+                <a16:creationId xmlns:a16="http://schemas.microsoft.com/office/drawing/2014/main" id="{9276B2D2-6E39-4DAA-83BD-0AD58C6AD5D2}"/>
               </a:ext>
             </a:extLst>
           </p:cNvPr>
@@ -6248,8 +6248,8 @@
         </p:blipFill>
         <p:spPr>
           <a:xfrm>
-            <a:off x="1286933" y="1948180"/>
-            <a:ext cx="5198533" cy="6238240"/>
+            <a:off x="1862781" y="1994071"/>
+            <a:ext cx="4046838" cy="6070258"/>
           </a:xfrm>
           <a:prstGeom prst="rect">
             <a:avLst/>
@@ -7456,10 +7456,10 @@
       </p:sp>
       <p:pic>
         <p:nvPicPr>
-          <p:cNvPr id="4" name="Picture 3" descr="Chart&#10;&#10;Description automatically generated">
+          <p:cNvPr id="8" name="Picture 7" descr="Chart, waterfall chart&#10;&#10;Description automatically generated">
             <a:extLst>
               <a:ext uri="{FF2B5EF4-FFF2-40B4-BE49-F238E27FC236}">
-                <a16:creationId xmlns:a16="http://schemas.microsoft.com/office/drawing/2014/main" id="{4D249CF3-5E18-41CE-939E-D9850C86CAF8}"/>
+                <a16:creationId xmlns:a16="http://schemas.microsoft.com/office/drawing/2014/main" id="{CDDF5D73-2661-47B0-8F14-86665509E4F3}"/>
               </a:ext>
             </a:extLst>
           </p:cNvPr>
@@ -7468,7 +7468,7 @@
           </p:cNvPicPr>
           <p:nvPr/>
         </p:nvPicPr>
-        <p:blipFill rotWithShape="1">
+        <p:blipFill>
           <a:blip r:embed="rId2">
             <a:extLst>
               <a:ext uri="{28A0092B-C50C-407E-A947-70E740481C1C}">
@@ -7476,70 +7476,20 @@
               </a:ext>
             </a:extLst>
           </a:blip>
-          <a:srcRect t="43376"/>
-          <a:stretch/>
+          <a:stretch>
+            <a:fillRect/>
+          </a:stretch>
         </p:blipFill>
         <p:spPr>
           <a:xfrm>
-            <a:off x="1146108" y="3531615"/>
-            <a:ext cx="5480183" cy="3713051"/>
+            <a:off x="1637488" y="3348681"/>
+            <a:ext cx="4497423" cy="3361037"/>
           </a:xfrm>
           <a:prstGeom prst="rect">
             <a:avLst/>
           </a:prstGeom>
         </p:spPr>
       </p:pic>
-      <p:sp>
-        <p:nvSpPr>
-          <p:cNvPr id="5" name="Rectangle 4">
-            <a:extLst>
-              <a:ext uri="{FF2B5EF4-FFF2-40B4-BE49-F238E27FC236}">
-                <a16:creationId xmlns:a16="http://schemas.microsoft.com/office/drawing/2014/main" id="{AACDD59D-430C-4B12-84E8-EB4FE4FF8CDE}"/>
-              </a:ext>
-            </a:extLst>
-          </p:cNvPr>
-          <p:cNvSpPr/>
-          <p:nvPr/>
-        </p:nvSpPr>
-        <p:spPr>
-          <a:xfrm>
-            <a:off x="1658113" y="3531615"/>
-            <a:ext cx="4852416" cy="2633473"/>
-          </a:xfrm>
-          <a:prstGeom prst="rect">
-            <a:avLst/>
-          </a:prstGeom>
-          <a:solidFill>
-            <a:schemeClr val="tx2">
-              <a:alpha val="43922"/>
-            </a:schemeClr>
-          </a:solidFill>
-        </p:spPr>
-        <p:style>
-          <a:lnRef idx="2">
-            <a:schemeClr val="accent1">
-              <a:shade val="50000"/>
-            </a:schemeClr>
-          </a:lnRef>
-          <a:fillRef idx="1">
-            <a:schemeClr val="accent1"/>
-          </a:fillRef>
-          <a:effectRef idx="0">
-            <a:schemeClr val="accent1"/>
-          </a:effectRef>
-          <a:fontRef idx="minor">
-            <a:schemeClr val="lt1"/>
-          </a:fontRef>
-        </p:style>
-        <p:txBody>
-          <a:bodyPr rtlCol="0" anchor="ctr"/>
-          <a:lstStyle/>
-          <a:p>
-            <a:pPr algn="ctr"/>
-            <a:endParaRPr lang="en-US"/>
-          </a:p>
-        </p:txBody>
-      </p:sp>
     </p:spTree>
     <p:extLst>
       <p:ext uri="{BB962C8B-B14F-4D97-AF65-F5344CB8AC3E}">

</xml_diff>